<commit_message>
working on UCONN talk
</commit_message>
<xml_diff>
--- a/5 Presentations/UCONN 2022.pptx
+++ b/5 Presentations/UCONN 2022.pptx
@@ -35,8 +35,9 @@
     <p:sldId id="286" r:id="rId29"/>
     <p:sldId id="285" r:id="rId30"/>
     <p:sldId id="277" r:id="rId31"/>
-    <p:sldId id="297" r:id="rId32"/>
-    <p:sldId id="296" r:id="rId33"/>
+    <p:sldId id="305" r:id="rId32"/>
+    <p:sldId id="306" r:id="rId33"/>
+    <p:sldId id="296" r:id="rId34"/>
   </p:sldIdLst>
   <p:sldSz cx="9144000" cy="6858000" type="screen4x3"/>
   <p:notesSz cx="6858000" cy="9144000"/>
@@ -593,7 +594,7 @@
           <a:p>
             <a:fld id="{1B04FFF2-C519-4852-BB84-2A3EE9233315}" type="datetimeFigureOut">
               <a:rPr lang="en-US" smtClean="0"/>
-              <a:t>10/4/2022</a:t>
+              <a:t>10/10/2022</a:t>
             </a:fld>
             <a:endParaRPr lang="en-US"/>
           </a:p>
@@ -763,7 +764,7 @@
           <a:p>
             <a:fld id="{1B04FFF2-C519-4852-BB84-2A3EE9233315}" type="datetimeFigureOut">
               <a:rPr lang="en-US" smtClean="0"/>
-              <a:t>10/4/2022</a:t>
+              <a:t>10/10/2022</a:t>
             </a:fld>
             <a:endParaRPr lang="en-US"/>
           </a:p>
@@ -943,7 +944,7 @@
           <a:p>
             <a:fld id="{1B04FFF2-C519-4852-BB84-2A3EE9233315}" type="datetimeFigureOut">
               <a:rPr lang="en-US" smtClean="0"/>
-              <a:t>10/4/2022</a:t>
+              <a:t>10/10/2022</a:t>
             </a:fld>
             <a:endParaRPr lang="en-US"/>
           </a:p>
@@ -1113,7 +1114,7 @@
           <a:p>
             <a:fld id="{1B04FFF2-C519-4852-BB84-2A3EE9233315}" type="datetimeFigureOut">
               <a:rPr lang="en-US" smtClean="0"/>
-              <a:t>10/4/2022</a:t>
+              <a:t>10/10/2022</a:t>
             </a:fld>
             <a:endParaRPr lang="en-US"/>
           </a:p>
@@ -1357,7 +1358,7 @@
           <a:p>
             <a:fld id="{1B04FFF2-C519-4852-BB84-2A3EE9233315}" type="datetimeFigureOut">
               <a:rPr lang="en-US" smtClean="0"/>
-              <a:t>10/4/2022</a:t>
+              <a:t>10/10/2022</a:t>
             </a:fld>
             <a:endParaRPr lang="en-US"/>
           </a:p>
@@ -1589,7 +1590,7 @@
           <a:p>
             <a:fld id="{1B04FFF2-C519-4852-BB84-2A3EE9233315}" type="datetimeFigureOut">
               <a:rPr lang="en-US" smtClean="0"/>
-              <a:t>10/4/2022</a:t>
+              <a:t>10/10/2022</a:t>
             </a:fld>
             <a:endParaRPr lang="en-US"/>
           </a:p>
@@ -1956,7 +1957,7 @@
           <a:p>
             <a:fld id="{1B04FFF2-C519-4852-BB84-2A3EE9233315}" type="datetimeFigureOut">
               <a:rPr lang="en-US" smtClean="0"/>
-              <a:t>10/4/2022</a:t>
+              <a:t>10/10/2022</a:t>
             </a:fld>
             <a:endParaRPr lang="en-US"/>
           </a:p>
@@ -2074,7 +2075,7 @@
           <a:p>
             <a:fld id="{1B04FFF2-C519-4852-BB84-2A3EE9233315}" type="datetimeFigureOut">
               <a:rPr lang="en-US" smtClean="0"/>
-              <a:t>10/4/2022</a:t>
+              <a:t>10/10/2022</a:t>
             </a:fld>
             <a:endParaRPr lang="en-US"/>
           </a:p>
@@ -2169,7 +2170,7 @@
           <a:p>
             <a:fld id="{1B04FFF2-C519-4852-BB84-2A3EE9233315}" type="datetimeFigureOut">
               <a:rPr lang="en-US" smtClean="0"/>
-              <a:t>10/4/2022</a:t>
+              <a:t>10/10/2022</a:t>
             </a:fld>
             <a:endParaRPr lang="en-US"/>
           </a:p>
@@ -2446,7 +2447,7 @@
           <a:p>
             <a:fld id="{1B04FFF2-C519-4852-BB84-2A3EE9233315}" type="datetimeFigureOut">
               <a:rPr lang="en-US" smtClean="0"/>
-              <a:t>10/4/2022</a:t>
+              <a:t>10/10/2022</a:t>
             </a:fld>
             <a:endParaRPr lang="en-US"/>
           </a:p>
@@ -2703,7 +2704,7 @@
           <a:p>
             <a:fld id="{1B04FFF2-C519-4852-BB84-2A3EE9233315}" type="datetimeFigureOut">
               <a:rPr lang="en-US" smtClean="0"/>
-              <a:t>10/4/2022</a:t>
+              <a:t>10/10/2022</a:t>
             </a:fld>
             <a:endParaRPr lang="en-US"/>
           </a:p>
@@ -2916,7 +2917,7 @@
           <a:p>
             <a:fld id="{1B04FFF2-C519-4852-BB84-2A3EE9233315}" type="datetimeFigureOut">
               <a:rPr lang="en-US" smtClean="0"/>
-              <a:t>10/4/2022</a:t>
+              <a:t>10/10/2022</a:t>
             </a:fld>
             <a:endParaRPr lang="en-US"/>
           </a:p>
@@ -9926,13 +9927,17 @@
         <p:spPr/>
         <p:txBody>
           <a:bodyPr>
-            <a:normAutofit/>
+            <a:normAutofit lnSpcReduction="10000"/>
           </a:bodyPr>
           <a:lstStyle/>
           <a:p>
             <a:r>
+              <a:rPr lang="en-US" b="1" dirty="0"/>
+              <a:t>Affordance Strength: </a:t>
+            </a:r>
+            <a:r>
               <a:rPr lang="en-US" dirty="0"/>
-              <a:t>Affordance Strength: Probability of a specific affordance being given for a specific cue</a:t>
+              <a:t>Probability of a specific affordance being given for a specific cue</a:t>
             </a:r>
           </a:p>
           <a:p>
@@ -9970,21 +9975,27 @@
             <a:endParaRPr lang="en-US" b="1" dirty="0"/>
           </a:p>
           <a:p>
+            <a:r>
+              <a:rPr lang="en-US" b="1" dirty="0"/>
+              <a:t>Affordance Set Size: </a:t>
+            </a:r>
+            <a:r>
+              <a:rPr lang="en-US" dirty="0"/>
+              <a:t>Number of unique affordances elicited for each cue</a:t>
+            </a:r>
+          </a:p>
+          <a:p>
+            <a:endParaRPr lang="en-US" b="1" dirty="0"/>
+          </a:p>
+          <a:p>
             <a:pPr lvl="1"/>
             <a:r>
-              <a:rPr lang="en-US" dirty="0"/>
-              <a:t>Some affordances should be more common than others</a:t>
-            </a:r>
-          </a:p>
-          <a:p>
-            <a:pPr lvl="1"/>
-            <a:endParaRPr lang="en-US" b="1" dirty="0"/>
-          </a:p>
-          <a:p>
-            <a:pPr lvl="1"/>
-            <a:r>
-              <a:rPr lang="en-US" b="1" dirty="0"/>
-              <a:t>But…. Do some objects have a broader range of use than others?</a:t>
+              <a:rPr lang="en-US" b="1" dirty="0">
+                <a:solidFill>
+                  <a:schemeClr val="accent1"/>
+                </a:solidFill>
+              </a:rPr>
+              <a:t>Do some objects have a broader range of use than others?</a:t>
             </a:r>
           </a:p>
           <a:p>
@@ -10006,6 +10017,116 @@
   <p:clrMapOvr>
     <a:masterClrMapping/>
   </p:clrMapOvr>
+  <p:timing>
+    <p:tnLst>
+      <p:par>
+        <p:cTn id="1" dur="indefinite" restart="never" nodeType="tmRoot">
+          <p:childTnLst>
+            <p:seq concurrent="1" nextAc="seek">
+              <p:cTn id="2" dur="indefinite" nodeType="mainSeq">
+                <p:childTnLst>
+                  <p:par>
+                    <p:cTn id="3" fill="hold">
+                      <p:stCondLst>
+                        <p:cond delay="indefinite"/>
+                      </p:stCondLst>
+                      <p:childTnLst>
+                        <p:par>
+                          <p:cTn id="4" fill="hold">
+                            <p:stCondLst>
+                              <p:cond delay="0"/>
+                            </p:stCondLst>
+                            <p:childTnLst>
+                              <p:par>
+                                <p:cTn id="5" presetID="1" presetClass="entr" presetSubtype="0" fill="hold" nodeType="clickEffect">
+                                  <p:stCondLst>
+                                    <p:cond delay="0"/>
+                                  </p:stCondLst>
+                                  <p:childTnLst>
+                                    <p:set>
+                                      <p:cBhvr>
+                                        <p:cTn id="6" dur="1" fill="hold">
+                                          <p:stCondLst>
+                                            <p:cond delay="0"/>
+                                          </p:stCondLst>
+                                        </p:cTn>
+                                        <p:tgtEl>
+                                          <p:spTgt spid="3">
+                                            <p:txEl>
+                                              <p:pRg st="4" end="4"/>
+                                            </p:txEl>
+                                          </p:spTgt>
+                                        </p:tgtEl>
+                                        <p:attrNameLst>
+                                          <p:attrName>style.visibility</p:attrName>
+                                        </p:attrNameLst>
+                                      </p:cBhvr>
+                                      <p:to>
+                                        <p:strVal val="visible"/>
+                                      </p:to>
+                                    </p:set>
+                                  </p:childTnLst>
+                                </p:cTn>
+                              </p:par>
+                              <p:par>
+                                <p:cTn id="7" presetID="1" presetClass="entr" presetSubtype="0" fill="hold" nodeType="withEffect">
+                                  <p:stCondLst>
+                                    <p:cond delay="0"/>
+                                  </p:stCondLst>
+                                  <p:childTnLst>
+                                    <p:set>
+                                      <p:cBhvr>
+                                        <p:cTn id="8" dur="1" fill="hold">
+                                          <p:stCondLst>
+                                            <p:cond delay="0"/>
+                                          </p:stCondLst>
+                                        </p:cTn>
+                                        <p:tgtEl>
+                                          <p:spTgt spid="3">
+                                            <p:txEl>
+                                              <p:pRg st="6" end="6"/>
+                                            </p:txEl>
+                                          </p:spTgt>
+                                        </p:tgtEl>
+                                        <p:attrNameLst>
+                                          <p:attrName>style.visibility</p:attrName>
+                                        </p:attrNameLst>
+                                      </p:cBhvr>
+                                      <p:to>
+                                        <p:strVal val="visible"/>
+                                      </p:to>
+                                    </p:set>
+                                  </p:childTnLst>
+                                </p:cTn>
+                              </p:par>
+                            </p:childTnLst>
+                          </p:cTn>
+                        </p:par>
+                      </p:childTnLst>
+                    </p:cTn>
+                  </p:par>
+                </p:childTnLst>
+              </p:cTn>
+              <p:prevCondLst>
+                <p:cond evt="onPrev" delay="0">
+                  <p:tgtEl>
+                    <p:sldTgt/>
+                  </p:tgtEl>
+                </p:cond>
+              </p:prevCondLst>
+              <p:nextCondLst>
+                <p:cond evt="onNext" delay="0">
+                  <p:tgtEl>
+                    <p:sldTgt/>
+                  </p:tgtEl>
+                </p:cond>
+              </p:nextCondLst>
+            </p:seq>
+          </p:childTnLst>
+        </p:cTn>
+      </p:par>
+    </p:tnLst>
+  </p:timing>
 </p:sld>
 </file>
 
@@ -10132,7 +10253,7 @@
             </a:r>
             <a:r>
               <a:rPr lang="en-US" dirty="0"/>
-              <a:t> responses</a:t>
+              <a:t> responses!</a:t>
             </a:r>
           </a:p>
           <a:p>
@@ -11544,87 +11665,37 @@
           <a:p>
             <a:r>
               <a:rPr lang="en-US" dirty="0"/>
-              <a:t>Currently, data collection is about </a:t>
+              <a:t>Currently, data collection is </a:t>
             </a:r>
             <a:r>
               <a:rPr lang="en-US" b="1" dirty="0">
                 <a:solidFill>
                   <a:schemeClr val="accent1"/>
                 </a:solidFill>
-                <a:highlight>
-                  <a:srgbClr val="FFFF00"/>
-                </a:highlight>
               </a:rPr>
-              <a:t>XX%</a:t>
+              <a:t>~27%</a:t>
             </a:r>
             <a:r>
               <a:rPr lang="en-US" dirty="0"/>
-              <a:t> complete (</a:t>
-            </a:r>
-            <a:r>
-              <a:rPr lang="en-US" dirty="0">
-                <a:highlight>
-                  <a:srgbClr val="FFFF00"/>
-                </a:highlight>
-              </a:rPr>
-              <a:t>XXX</a:t>
-            </a:r>
+              <a:t> complete (796/3000) (October 2022)</a:t>
+            </a:r>
+          </a:p>
+          <a:p>
+            <a:endParaRPr lang="en-US" dirty="0"/>
+          </a:p>
+          <a:p>
             <a:r>
               <a:rPr lang="en-US" dirty="0"/>
-              <a:t>/3000) (October 2022)</a:t>
+              <a:t>Data collection currently ongoing at the University of Southern Mississippi, Midwestern State University, and 7 partner institutions</a:t>
             </a:r>
           </a:p>
           <a:p>
             <a:endParaRPr lang="en-US" dirty="0"/>
           </a:p>
           <a:p>
-            <a:r>
-              <a:rPr lang="en-US" dirty="0"/>
-              <a:t>Data collection currently ongoing at the University of Southern Mississippi, Midwestern State University, and </a:t>
-            </a:r>
-            <a:r>
-              <a:rPr lang="en-US" dirty="0">
-                <a:highlight>
-                  <a:srgbClr val="FFFF00"/>
-                </a:highlight>
-              </a:rPr>
-              <a:t>XX</a:t>
-            </a:r>
-            <a:r>
-              <a:rPr lang="en-US" dirty="0"/>
-              <a:t> partner institutions</a:t>
-            </a:r>
-          </a:p>
-          <a:p>
-            <a:endParaRPr lang="en-US" dirty="0"/>
-          </a:p>
-          <a:p>
-            <a:r>
-              <a:rPr lang="en-US" dirty="0"/>
-              <a:t>All words currently normed by at least </a:t>
-            </a:r>
-            <a:r>
-              <a:rPr lang="en-US" dirty="0">
-                <a:highlight>
-                  <a:srgbClr val="FFFF00"/>
-                </a:highlight>
-              </a:rPr>
-              <a:t>xx</a:t>
-            </a:r>
-            <a:r>
-              <a:rPr lang="en-US" dirty="0"/>
-              <a:t> participants </a:t>
-            </a:r>
-            <a:r>
-              <a:rPr lang="en-US" dirty="0">
-                <a:highlight>
-                  <a:srgbClr val="FFFF00"/>
-                </a:highlight>
-              </a:rPr>
-              <a:t>(xx – xx)</a:t>
-            </a:r>
-          </a:p>
-          <a:p>
+            <a:pPr marL="0" indent="0">
+              <a:buNone/>
+            </a:pPr>
             <a:endParaRPr lang="en-US" dirty="0"/>
           </a:p>
           <a:p>
@@ -11672,7 +11743,7 @@
           <a:p>
             <a:r>
               <a:rPr lang="en-US" b="1" dirty="0"/>
-              <a:t>Current Status</a:t>
+              <a:t>Current Project Status</a:t>
             </a:r>
           </a:p>
         </p:txBody>
@@ -11726,7 +11797,7 @@
         <p:spPr>
           <a:xfrm>
             <a:off x="628650" y="1352255"/>
-            <a:ext cx="7886700" cy="3019722"/>
+            <a:ext cx="7886700" cy="4106436"/>
           </a:xfrm>
         </p:spPr>
         <p:txBody>
@@ -11734,6 +11805,116 @@
             <a:normAutofit/>
           </a:bodyPr>
           <a:lstStyle/>
+          <a:p>
+            <a:r>
+              <a:rPr lang="en-US" dirty="0"/>
+              <a:t>Each cue is currently averaging ~6 </a:t>
+            </a:r>
+            <a:r>
+              <a:rPr lang="en-US" b="1" dirty="0"/>
+              <a:t>unique</a:t>
+            </a:r>
+            <a:r>
+              <a:rPr lang="en-US" b="1" dirty="0">
+                <a:solidFill>
+                  <a:schemeClr val="accent1"/>
+                </a:solidFill>
+              </a:rPr>
+              <a:t> affordance</a:t>
+            </a:r>
+            <a:r>
+              <a:rPr lang="en-US" dirty="0">
+                <a:solidFill>
+                  <a:schemeClr val="accent1"/>
+                </a:solidFill>
+              </a:rPr>
+              <a:t> </a:t>
+            </a:r>
+            <a:r>
+              <a:rPr lang="en-US" b="1" dirty="0">
+                <a:solidFill>
+                  <a:schemeClr val="accent1"/>
+                </a:solidFill>
+              </a:rPr>
+              <a:t>responses</a:t>
+            </a:r>
+            <a:r>
+              <a:rPr lang="en-US" b="1" dirty="0"/>
+              <a:t> </a:t>
+            </a:r>
+            <a:r>
+              <a:rPr lang="en-US" dirty="0"/>
+              <a:t>(</a:t>
+            </a:r>
+            <a:r>
+              <a:rPr lang="en-US" i="1" dirty="0"/>
+              <a:t>M</a:t>
+            </a:r>
+            <a:r>
+              <a:rPr lang="en-US" dirty="0"/>
+              <a:t> = 6.20)</a:t>
+            </a:r>
+          </a:p>
+          <a:p>
+            <a:pPr lvl="1"/>
+            <a:r>
+              <a:rPr lang="en-US" i="1" dirty="0" err="1"/>
+              <a:t>sd</a:t>
+            </a:r>
+            <a:r>
+              <a:rPr lang="en-US" dirty="0"/>
+              <a:t> = 3.71; min = 1; max = 37</a:t>
+            </a:r>
+          </a:p>
+          <a:p>
+            <a:pPr lvl="1"/>
+            <a:endParaRPr lang="en-US" dirty="0"/>
+          </a:p>
+          <a:p>
+            <a:r>
+              <a:rPr lang="en-US" b="1" dirty="0">
+                <a:solidFill>
+                  <a:schemeClr val="accent1"/>
+                </a:solidFill>
+              </a:rPr>
+              <a:t>Cues w/ Most affordances:</a:t>
+            </a:r>
+          </a:p>
+          <a:p>
+            <a:pPr lvl="1"/>
+            <a:r>
+              <a:rPr lang="en-US" dirty="0"/>
+              <a:t>Automobile (37)</a:t>
+            </a:r>
+          </a:p>
+          <a:p>
+            <a:pPr lvl="1"/>
+            <a:r>
+              <a:rPr lang="en-US" dirty="0"/>
+              <a:t>Snowfall (19)</a:t>
+            </a:r>
+          </a:p>
+          <a:p>
+            <a:pPr lvl="1"/>
+            <a:r>
+              <a:rPr lang="en-US" dirty="0"/>
+              <a:t>Branch (18)</a:t>
+            </a:r>
+          </a:p>
+          <a:p>
+            <a:pPr lvl="1"/>
+            <a:endParaRPr lang="en-US" dirty="0">
+              <a:highlight>
+                <a:srgbClr val="FFFF00"/>
+              </a:highlight>
+            </a:endParaRPr>
+          </a:p>
+          <a:p>
+            <a:endParaRPr lang="en-US" dirty="0"/>
+          </a:p>
+          <a:p>
+            <a:endParaRPr lang="en-US" dirty="0"/>
+          </a:p>
           <a:p>
             <a:pPr marL="0" indent="0">
               <a:buNone/>
@@ -11776,91 +11957,15 @@
           <a:p>
             <a:r>
               <a:rPr lang="en-US" b="1" dirty="0"/>
-              <a:t>Emerging themes</a:t>
-            </a:r>
-          </a:p>
-        </p:txBody>
-      </p:sp>
-      <p:sp>
-        <p:nvSpPr>
-          <p:cNvPr id="2" name="TextBox 1">
-            <a:extLst>
-              <a:ext uri="{FF2B5EF4-FFF2-40B4-BE49-F238E27FC236}">
-                <a16:creationId xmlns:a16="http://schemas.microsoft.com/office/drawing/2014/main" id="{9597A45F-32AF-3711-0048-DB893FD0BD17}"/>
-              </a:ext>
-            </a:extLst>
-          </p:cNvPr>
-          <p:cNvSpPr txBox="1"/>
-          <p:nvPr/>
-        </p:nvSpPr>
-        <p:spPr>
-          <a:xfrm>
-            <a:off x="768927" y="1655618"/>
-            <a:ext cx="7426037" cy="1569660"/>
-          </a:xfrm>
-          <a:prstGeom prst="rect">
-            <a:avLst/>
-          </a:prstGeom>
-          <a:noFill/>
-        </p:spPr>
-        <p:txBody>
-          <a:bodyPr wrap="square" rtlCol="0">
-            <a:spAutoFit/>
-          </a:bodyPr>
-          <a:lstStyle/>
-          <a:p>
-            <a:pPr marL="285750" indent="-285750">
-              <a:buFont typeface="Arial" panose="020B0604020202020204" pitchFamily="34" charset="0"/>
-              <a:buChar char="•"/>
-            </a:pPr>
-            <a:r>
-              <a:rPr lang="en-US" sz="2400" dirty="0">
-                <a:highlight>
-                  <a:srgbClr val="FFFF00"/>
-                </a:highlight>
-              </a:rPr>
-              <a:t>Proportion of Noun vs Verb Responses</a:t>
-            </a:r>
-          </a:p>
-          <a:p>
-            <a:pPr marL="285750" indent="-285750">
-              <a:buFont typeface="Arial" panose="020B0604020202020204" pitchFamily="34" charset="0"/>
-              <a:buChar char="•"/>
-            </a:pPr>
-            <a:endParaRPr lang="en-US" sz="2400" dirty="0">
-              <a:highlight>
-                <a:srgbClr val="FFFF00"/>
-              </a:highlight>
-            </a:endParaRPr>
-          </a:p>
-          <a:p>
-            <a:pPr marL="285750" indent="-285750">
-              <a:buFont typeface="Arial" panose="020B0604020202020204" pitchFamily="34" charset="0"/>
-              <a:buChar char="•"/>
-            </a:pPr>
-            <a:endParaRPr lang="en-US" sz="2400" dirty="0">
-              <a:highlight>
-                <a:srgbClr val="FFFF00"/>
-              </a:highlight>
-            </a:endParaRPr>
-          </a:p>
-          <a:p>
-            <a:pPr marL="285750" indent="-285750">
-              <a:buFont typeface="Arial" panose="020B0604020202020204" pitchFamily="34" charset="0"/>
-              <a:buChar char="•"/>
-            </a:pPr>
-            <a:endParaRPr lang="en-US" sz="2400" dirty="0">
-              <a:highlight>
-                <a:srgbClr val="FFFF00"/>
-              </a:highlight>
-            </a:endParaRPr>
+              <a:t>Current Snapshot</a:t>
+            </a:r>
           </a:p>
         </p:txBody>
       </p:sp>
     </p:spTree>
     <p:extLst>
       <p:ext uri="{BB962C8B-B14F-4D97-AF65-F5344CB8AC3E}">
-        <p14:creationId xmlns:p14="http://schemas.microsoft.com/office/powerpoint/2010/main" val="455950836"/>
+        <p14:creationId xmlns:p14="http://schemas.microsoft.com/office/powerpoint/2010/main" val="188844732"/>
       </p:ext>
     </p:extLst>
   </p:cSld>
@@ -11871,6 +11976,183 @@
 </file>
 
 <file path=ppt/slides/slide32.xml><?xml version="1.0" encoding="utf-8"?>
+<p:sld xmlns:a="http://schemas.openxmlformats.org/drawingml/2006/main" xmlns:r="http://schemas.openxmlformats.org/officeDocument/2006/relationships" xmlns:p="http://schemas.openxmlformats.org/presentationml/2006/main">
+  <p:cSld>
+    <p:spTree>
+      <p:nvGrpSpPr>
+        <p:cNvPr id="1" name=""/>
+        <p:cNvGrpSpPr/>
+        <p:nvPr/>
+      </p:nvGrpSpPr>
+      <p:grpSpPr>
+        <a:xfrm>
+          <a:off x="0" y="0"/>
+          <a:ext cx="0" cy="0"/>
+          <a:chOff x="0" y="0"/>
+          <a:chExt cx="0" cy="0"/>
+        </a:xfrm>
+      </p:grpSpPr>
+      <p:sp>
+        <p:nvSpPr>
+          <p:cNvPr id="3" name="Content Placeholder 2">
+            <a:extLst>
+              <a:ext uri="{FF2B5EF4-FFF2-40B4-BE49-F238E27FC236}">
+                <a16:creationId xmlns:a16="http://schemas.microsoft.com/office/drawing/2014/main" id="{230E2F2D-D106-95EA-E18E-0D7D459DA9A1}"/>
+              </a:ext>
+            </a:extLst>
+          </p:cNvPr>
+          <p:cNvSpPr>
+            <a:spLocks noGrp="1"/>
+          </p:cNvSpPr>
+          <p:nvPr>
+            <p:ph idx="1"/>
+          </p:nvPr>
+        </p:nvSpPr>
+        <p:spPr>
+          <a:xfrm>
+            <a:off x="628650" y="1352255"/>
+            <a:ext cx="7886700" cy="4106436"/>
+          </a:xfrm>
+        </p:spPr>
+        <p:txBody>
+          <a:bodyPr>
+            <a:normAutofit/>
+          </a:bodyPr>
+          <a:lstStyle/>
+          <a:p>
+            <a:r>
+              <a:rPr lang="en-US" b="1" dirty="0"/>
+              <a:t>Automobile</a:t>
+            </a:r>
+          </a:p>
+          <a:p>
+            <a:pPr lvl="1"/>
+            <a:r>
+              <a:rPr lang="en-US" sz="2000" dirty="0">
+                <a:highlight>
+                  <a:srgbClr val="FFFF00"/>
+                </a:highlight>
+              </a:rPr>
+              <a:t>[PERCENTAGES]</a:t>
+            </a:r>
+          </a:p>
+          <a:p>
+            <a:pPr lvl="1"/>
+            <a:endParaRPr lang="en-US" dirty="0"/>
+          </a:p>
+          <a:p>
+            <a:r>
+              <a:rPr lang="en-US" b="1" dirty="0"/>
+              <a:t>Snowfall</a:t>
+            </a:r>
+          </a:p>
+          <a:p>
+            <a:pPr lvl="1"/>
+            <a:r>
+              <a:rPr lang="en-US" sz="2000" dirty="0">
+                <a:highlight>
+                  <a:srgbClr val="FFFF00"/>
+                </a:highlight>
+              </a:rPr>
+              <a:t>[PERCENTAGES]</a:t>
+            </a:r>
+          </a:p>
+          <a:p>
+            <a:endParaRPr lang="en-US" dirty="0"/>
+          </a:p>
+          <a:p>
+            <a:r>
+              <a:rPr lang="en-US" b="1"/>
+              <a:t>Branch</a:t>
+            </a:r>
+            <a:endParaRPr lang="en-US" b="1" dirty="0"/>
+          </a:p>
+          <a:p>
+            <a:pPr lvl="1"/>
+            <a:r>
+              <a:rPr lang="en-US" sz="2000" dirty="0">
+                <a:highlight>
+                  <a:srgbClr val="FFFF00"/>
+                </a:highlight>
+              </a:rPr>
+              <a:t>[PERCENTAGES]</a:t>
+            </a:r>
+          </a:p>
+          <a:p>
+            <a:pPr lvl="1"/>
+            <a:endParaRPr lang="en-US" dirty="0">
+              <a:highlight>
+                <a:srgbClr val="FFFF00"/>
+              </a:highlight>
+            </a:endParaRPr>
+          </a:p>
+          <a:p>
+            <a:endParaRPr lang="en-US" dirty="0"/>
+          </a:p>
+          <a:p>
+            <a:endParaRPr lang="en-US" dirty="0"/>
+          </a:p>
+          <a:p>
+            <a:pPr marL="0" indent="0">
+              <a:buNone/>
+            </a:pPr>
+            <a:endParaRPr lang="en-US" dirty="0"/>
+          </a:p>
+          <a:p>
+            <a:endParaRPr lang="en-US" dirty="0"/>
+          </a:p>
+          <a:p>
+            <a:endParaRPr lang="en-US" dirty="0"/>
+          </a:p>
+        </p:txBody>
+      </p:sp>
+      <p:sp>
+        <p:nvSpPr>
+          <p:cNvPr id="13" name="Title 1">
+            <a:extLst>
+              <a:ext uri="{FF2B5EF4-FFF2-40B4-BE49-F238E27FC236}">
+                <a16:creationId xmlns:a16="http://schemas.microsoft.com/office/drawing/2014/main" id="{B8C731E7-87E6-D4D4-930D-630DE8399438}"/>
+              </a:ext>
+            </a:extLst>
+          </p:cNvPr>
+          <p:cNvSpPr>
+            <a:spLocks noGrp="1"/>
+          </p:cNvSpPr>
+          <p:nvPr>
+            <p:ph type="title"/>
+          </p:nvPr>
+        </p:nvSpPr>
+        <p:spPr>
+          <a:xfrm>
+            <a:off x="628650" y="148925"/>
+            <a:ext cx="7886700" cy="1325563"/>
+          </a:xfrm>
+        </p:spPr>
+        <p:txBody>
+          <a:bodyPr/>
+          <a:lstStyle/>
+          <a:p>
+            <a:r>
+              <a:rPr lang="en-US" b="1" dirty="0"/>
+              <a:t>Current Snapshot</a:t>
+            </a:r>
+          </a:p>
+        </p:txBody>
+      </p:sp>
+    </p:spTree>
+    <p:extLst>
+      <p:ext uri="{BB962C8B-B14F-4D97-AF65-F5344CB8AC3E}">
+        <p14:creationId xmlns:p14="http://schemas.microsoft.com/office/powerpoint/2010/main" val="4265069531"/>
+      </p:ext>
+    </p:extLst>
+  </p:cSld>
+  <p:clrMapOvr>
+    <a:masterClrMapping/>
+  </p:clrMapOvr>
+</p:sld>
+</file>
+
+<file path=ppt/slides/slide33.xml><?xml version="1.0" encoding="utf-8"?>
 <p:sld xmlns:a="http://schemas.openxmlformats.org/drawingml/2006/main" xmlns:r="http://schemas.openxmlformats.org/officeDocument/2006/relationships" xmlns:p="http://schemas.openxmlformats.org/presentationml/2006/main">
   <p:cSld>
     <p:spTree>
@@ -14022,12 +14304,8 @@
           <a:p>
             <a:pPr lvl="1"/>
             <a:r>
-              <a:rPr lang="en-US" dirty="0">
-                <a:highlight>
-                  <a:srgbClr val="FFFF00"/>
-                </a:highlight>
-              </a:rPr>
-              <a:t>[SOMETHING]</a:t>
+              <a:rPr lang="en-US" b="1" dirty="0"/>
+              <a:t>Affordances == Action!</a:t>
             </a:r>
           </a:p>
           <a:p>
@@ -14199,56 +14477,6 @@
           </a:p>
         </p:txBody>
       </p:sp>
-      <p:sp>
-        <p:nvSpPr>
-          <p:cNvPr id="4" name="TextBox 3">
-            <a:extLst>
-              <a:ext uri="{FF2B5EF4-FFF2-40B4-BE49-F238E27FC236}">
-                <a16:creationId xmlns:a16="http://schemas.microsoft.com/office/drawing/2014/main" id="{852DE044-8049-D8C0-79B1-0F4D66923E22}"/>
-              </a:ext>
-            </a:extLst>
-          </p:cNvPr>
-          <p:cNvSpPr txBox="1"/>
-          <p:nvPr/>
-        </p:nvSpPr>
-        <p:spPr>
-          <a:xfrm>
-            <a:off x="114301" y="5014913"/>
-            <a:ext cx="9029699" cy="830997"/>
-          </a:xfrm>
-          <a:prstGeom prst="rect">
-            <a:avLst/>
-          </a:prstGeom>
-          <a:noFill/>
-        </p:spPr>
-        <p:txBody>
-          <a:bodyPr wrap="square" rtlCol="0">
-            <a:spAutoFit/>
-          </a:bodyPr>
-          <a:lstStyle/>
-          <a:p>
-            <a:pPr marL="285750" indent="-285750">
-              <a:buFont typeface="Arial" panose="020B0604020202020204" pitchFamily="34" charset="0"/>
-              <a:buChar char="•"/>
-            </a:pPr>
-            <a:endParaRPr lang="en-US" sz="2400" dirty="0"/>
-          </a:p>
-          <a:p>
-            <a:pPr marL="285750" indent="-285750">
-              <a:buFont typeface="Arial" panose="020B0604020202020204" pitchFamily="34" charset="0"/>
-              <a:buChar char="•"/>
-            </a:pPr>
-            <a:r>
-              <a:rPr lang="en-US" sz="2400" b="1" dirty="0"/>
-              <a:t>Affordances == Action</a:t>
-            </a:r>
-            <a:r>
-              <a:rPr lang="en-US" sz="2400" dirty="0"/>
-              <a:t>!</a:t>
-            </a:r>
-          </a:p>
-        </p:txBody>
-      </p:sp>
     </p:spTree>
     <p:extLst>
       <p:ext uri="{BB962C8B-B14F-4D97-AF65-F5344CB8AC3E}">
@@ -14294,37 +14522,6 @@
                                         </p:cTn>
                                         <p:tgtEl>
                                           <p:spTgt spid="10"/>
-                                        </p:tgtEl>
-                                        <p:attrNameLst>
-                                          <p:attrName>style.visibility</p:attrName>
-                                        </p:attrNameLst>
-                                      </p:cBhvr>
-                                      <p:to>
-                                        <p:strVal val="visible"/>
-                                      </p:to>
-                                    </p:set>
-                                  </p:childTnLst>
-                                </p:cTn>
-                              </p:par>
-                              <p:par>
-                                <p:cTn id="7" presetID="1" presetClass="entr" presetSubtype="0" fill="hold" nodeType="withEffect">
-                                  <p:stCondLst>
-                                    <p:cond delay="0"/>
-                                  </p:stCondLst>
-                                  <p:childTnLst>
-                                    <p:set>
-                                      <p:cBhvr>
-                                        <p:cTn id="8" dur="1" fill="hold">
-                                          <p:stCondLst>
-                                            <p:cond delay="0"/>
-                                          </p:stCondLst>
-                                        </p:cTn>
-                                        <p:tgtEl>
-                                          <p:spTgt spid="4">
-                                            <p:txEl>
-                                              <p:pRg st="1" end="1"/>
-                                            </p:txEl>
-                                          </p:spTgt>
                                         </p:tgtEl>
                                         <p:attrNameLst>
                                           <p:attrName>style.visibility</p:attrName>

</xml_diff>